<commit_message>
changed numpy added matplotlib fragment
</commit_message>
<xml_diff>
--- a/NumPy.pptx
+++ b/NumPy.pptx
@@ -236,7 +236,7 @@
           <a:p>
             <a:fld id="{0486B980-B205-4923-A15E-F02E470EC83C}" type="datetimeFigureOut">
               <a:rPr lang="en-US" smtClean="0"/>
-              <a:t>10/9/2015</a:t>
+              <a:t>10/11/2015</a:t>
             </a:fld>
             <a:endParaRPr lang="en-US"/>
           </a:p>
@@ -401,7 +401,7 @@
           <a:p>
             <a:fld id="{A7D4BD73-7414-41BA-A718-ABCCF6D5C25D}" type="datetimeFigureOut">
               <a:rPr lang="pt-BR" smtClean="0"/>
-              <a:t>09/10/2015</a:t>
+              <a:t>11/10/2015</a:t>
             </a:fld>
             <a:endParaRPr lang="pt-BR"/>
           </a:p>
@@ -1324,7 +1324,7 @@
           <a:p>
             <a:fld id="{0772F184-3C7A-4738-8F21-11E032F81423}" type="datetimeFigureOut">
               <a:rPr lang="pt-BR" smtClean="0"/>
-              <a:t>09/10/2015</a:t>
+              <a:t>11/10/2015</a:t>
             </a:fld>
             <a:endParaRPr lang="pt-BR"/>
           </a:p>
@@ -1647,7 +1647,7 @@
           <a:p>
             <a:fld id="{0772F184-3C7A-4738-8F21-11E032F81423}" type="datetimeFigureOut">
               <a:rPr lang="pt-BR" smtClean="0"/>
-              <a:t>09/10/2015</a:t>
+              <a:t>11/10/2015</a:t>
             </a:fld>
             <a:endParaRPr lang="pt-BR"/>
           </a:p>
@@ -1960,7 +1960,7 @@
           <a:p>
             <a:fld id="{0772F184-3C7A-4738-8F21-11E032F81423}" type="datetimeFigureOut">
               <a:rPr lang="pt-BR" smtClean="0"/>
-              <a:t>09/10/2015</a:t>
+              <a:t>11/10/2015</a:t>
             </a:fld>
             <a:endParaRPr lang="pt-BR"/>
           </a:p>
@@ -2198,7 +2198,7 @@
           <a:p>
             <a:fld id="{0772F184-3C7A-4738-8F21-11E032F81423}" type="datetimeFigureOut">
               <a:rPr lang="pt-BR" smtClean="0"/>
-              <a:t>09/10/2015</a:t>
+              <a:t>11/10/2015</a:t>
             </a:fld>
             <a:endParaRPr lang="pt-BR"/>
           </a:p>
@@ -2633,7 +2633,7 @@
           <a:p>
             <a:fld id="{0772F184-3C7A-4738-8F21-11E032F81423}" type="datetimeFigureOut">
               <a:rPr lang="pt-BR" smtClean="0"/>
-              <a:t>09/10/2015</a:t>
+              <a:t>11/10/2015</a:t>
             </a:fld>
             <a:endParaRPr lang="pt-BR"/>
           </a:p>
@@ -3143,7 +3143,7 @@
           <a:p>
             <a:fld id="{0772F184-3C7A-4738-8F21-11E032F81423}" type="datetimeFigureOut">
               <a:rPr lang="pt-BR" smtClean="0"/>
-              <a:t>09/10/2015</a:t>
+              <a:t>11/10/2015</a:t>
             </a:fld>
             <a:endParaRPr lang="pt-BR"/>
           </a:p>
@@ -3404,7 +3404,7 @@
           <a:p>
             <a:fld id="{0772F184-3C7A-4738-8F21-11E032F81423}" type="datetimeFigureOut">
               <a:rPr lang="pt-BR" smtClean="0"/>
-              <a:t>09/10/2015</a:t>
+              <a:t>11/10/2015</a:t>
             </a:fld>
             <a:endParaRPr lang="pt-BR"/>
           </a:p>
@@ -3642,7 +3642,7 @@
           <a:p>
             <a:fld id="{0772F184-3C7A-4738-8F21-11E032F81423}" type="datetimeFigureOut">
               <a:rPr lang="pt-BR" smtClean="0"/>
-              <a:t>09/10/2015</a:t>
+              <a:t>11/10/2015</a:t>
             </a:fld>
             <a:endParaRPr lang="pt-BR"/>
           </a:p>
@@ -4034,7 +4034,7 @@
           <a:p>
             <a:fld id="{0772F184-3C7A-4738-8F21-11E032F81423}" type="datetimeFigureOut">
               <a:rPr lang="pt-BR" smtClean="0"/>
-              <a:t>09/10/2015</a:t>
+              <a:t>11/10/2015</a:t>
             </a:fld>
             <a:endParaRPr lang="pt-BR"/>
           </a:p>
@@ -4441,7 +4441,7 @@
           <a:p>
             <a:fld id="{0772F184-3C7A-4738-8F21-11E032F81423}" type="datetimeFigureOut">
               <a:rPr lang="pt-BR" smtClean="0"/>
-              <a:t>09/10/2015</a:t>
+              <a:t>11/10/2015</a:t>
             </a:fld>
             <a:endParaRPr lang="pt-BR"/>
           </a:p>
@@ -4813,7 +4813,7 @@
           <a:p>
             <a:fld id="{0772F184-3C7A-4738-8F21-11E032F81423}" type="datetimeFigureOut">
               <a:rPr lang="pt-BR" smtClean="0"/>
-              <a:t>09/10/2015</a:t>
+              <a:t>11/10/2015</a:t>
             </a:fld>
             <a:endParaRPr lang="pt-BR"/>
           </a:p>
@@ -6888,6 +6888,30 @@
           </a:p>
           <a:p>
             <a:r>
+              <a:rPr lang="en-US" dirty="0" smtClean="0"/>
+              <a:t>&gt;&gt;&gt; </a:t>
+            </a:r>
+            <a:r>
+              <a:rPr lang="en-US" dirty="0" err="1" smtClean="0"/>
+              <a:t>np.linspace</a:t>
+            </a:r>
+            <a:r>
+              <a:rPr lang="en-US" dirty="0" smtClean="0"/>
+              <a:t>(0, 10, 5)</a:t>
+            </a:r>
+          </a:p>
+          <a:p>
+            <a:r>
+              <a:rPr lang="en-US" dirty="0" smtClean="0"/>
+              <a:t>array([  0.,  2.5,  5.,  7.5,  10.])</a:t>
+            </a:r>
+            <a:endParaRPr lang="en-US" dirty="0"/>
+          </a:p>
+          <a:p>
+            <a:endParaRPr lang="en-US" dirty="0" smtClean="0"/>
+          </a:p>
+          <a:p>
+            <a:r>
               <a:rPr lang="en-US" dirty="0"/>
               <a:t>&gt;&gt;&gt; </a:t>
             </a:r>
@@ -6900,13 +6924,14 @@
               <a:t>((2,3), </a:t>
             </a:r>
             <a:r>
-              <a:rPr lang="en-US" dirty="0" err="1"/>
+              <a:rPr lang="en-US" dirty="0" err="1" smtClean="0"/>
               <a:t>dtype</a:t>
             </a:r>
             <a:r>
-              <a:rPr lang="en-US" dirty="0"/>
-              <a:t>=float</a:t>
-            </a:r>
+              <a:rPr lang="en-US" dirty="0" smtClean="0"/>
+              <a:t>=float)</a:t>
+            </a:r>
+            <a:endParaRPr lang="en-US" dirty="0"/>
           </a:p>
           <a:p>
             <a:r>
@@ -6916,8 +6941,12 @@
           </a:p>
           <a:p>
             <a:r>
-              <a:rPr lang="en-US" dirty="0"/>
-              <a:t>[ 1., 1., 1</a:t>
+              <a:rPr lang="en-US" dirty="0" smtClean="0"/>
+              <a:t>       [ </a:t>
+            </a:r>
+            <a:r>
+              <a:rPr lang="en-US" dirty="0"/>
+              <a:t>1., 1., 1</a:t>
             </a:r>
             <a:r>
               <a:rPr lang="en-US" dirty="0" smtClean="0"/>
@@ -7042,7 +7071,9 @@
         </p:nvSpPr>
         <p:spPr/>
         <p:txBody>
-          <a:bodyPr/>
+          <a:bodyPr>
+            <a:normAutofit/>
+          </a:bodyPr>
           <a:lstStyle/>
           <a:p>
             <a:pPr marL="342900" indent="-342900">
@@ -7050,10 +7081,53 @@
               <a:buChar char="•"/>
             </a:pPr>
             <a:r>
-              <a:rPr lang="en-US" dirty="0" err="1" smtClean="0"/>
+              <a:rPr lang="en-US" sz="1500" b="1" dirty="0" err="1" smtClean="0">
+                <a:latin typeface="Courier New" panose="02070309020205020404" pitchFamily="49" charset="0"/>
+                <a:cs typeface="Courier New" panose="02070309020205020404" pitchFamily="49" charset="0"/>
+              </a:rPr>
               <a:t>arange</a:t>
             </a:r>
-            <a:endParaRPr lang="en-US" dirty="0" smtClean="0"/>
+            <a:r>
+              <a:rPr lang="en-US" sz="1500" b="1" dirty="0" smtClean="0">
+                <a:latin typeface="Courier New" panose="02070309020205020404" pitchFamily="49" charset="0"/>
+                <a:cs typeface="Courier New" panose="02070309020205020404" pitchFamily="49" charset="0"/>
+              </a:rPr>
+              <a:t>(n)</a:t>
+            </a:r>
+          </a:p>
+          <a:p>
+            <a:r>
+              <a:rPr lang="en-US" sz="1500" b="1" dirty="0">
+                <a:latin typeface="Courier New" panose="02070309020205020404" pitchFamily="49" charset="0"/>
+                <a:cs typeface="Courier New" panose="02070309020205020404" pitchFamily="49" charset="0"/>
+              </a:rPr>
+              <a:t> </a:t>
+            </a:r>
+            <a:r>
+              <a:rPr lang="en-US" sz="1500" b="1" dirty="0">
+                <a:latin typeface="Courier New" panose="02070309020205020404" pitchFamily="49" charset="0"/>
+                <a:cs typeface="Courier New" panose="02070309020205020404" pitchFamily="49" charset="0"/>
+              </a:rPr>
+              <a:t> </a:t>
+            </a:r>
+            <a:r>
+              <a:rPr lang="en-US" sz="1500" b="1" dirty="0" err="1" smtClean="0">
+                <a:latin typeface="Courier New" panose="02070309020205020404" pitchFamily="49" charset="0"/>
+                <a:cs typeface="Courier New" panose="02070309020205020404" pitchFamily="49" charset="0"/>
+              </a:rPr>
+              <a:t>arange</a:t>
+            </a:r>
+            <a:r>
+              <a:rPr lang="en-US" sz="1500" b="1" dirty="0" smtClean="0">
+                <a:latin typeface="Courier New" panose="02070309020205020404" pitchFamily="49" charset="0"/>
+                <a:cs typeface="Courier New" panose="02070309020205020404" pitchFamily="49" charset="0"/>
+              </a:rPr>
+              <a:t>(start, stop, step)</a:t>
+            </a:r>
+            <a:endParaRPr lang="en-US" sz="1500" b="1" dirty="0" smtClean="0">
+              <a:latin typeface="Courier New" panose="02070309020205020404" pitchFamily="49" charset="0"/>
+              <a:cs typeface="Courier New" panose="02070309020205020404" pitchFamily="49" charset="0"/>
+            </a:endParaRPr>
           </a:p>
           <a:p>
             <a:pPr marL="342900" indent="-342900">
@@ -7061,9 +7135,30 @@
               <a:buChar char="•"/>
             </a:pPr>
             <a:r>
-              <a:rPr lang="en-US" dirty="0" smtClean="0"/>
-              <a:t>ones</a:t>
-            </a:r>
+              <a:rPr lang="en-US" sz="1500" b="1" dirty="0" err="1">
+                <a:latin typeface="Courier New" panose="02070309020205020404" pitchFamily="49" charset="0"/>
+                <a:cs typeface="Courier New" panose="02070309020205020404" pitchFamily="49" charset="0"/>
+              </a:rPr>
+              <a:t>l</a:t>
+            </a:r>
+            <a:r>
+              <a:rPr lang="en-US" sz="1500" b="1" dirty="0" err="1" smtClean="0">
+                <a:latin typeface="Courier New" panose="02070309020205020404" pitchFamily="49" charset="0"/>
+                <a:cs typeface="Courier New" panose="02070309020205020404" pitchFamily="49" charset="0"/>
+              </a:rPr>
+              <a:t>inspace</a:t>
+            </a:r>
+            <a:r>
+              <a:rPr lang="en-US" sz="1500" b="1" dirty="0" smtClean="0">
+                <a:latin typeface="Courier New" panose="02070309020205020404" pitchFamily="49" charset="0"/>
+                <a:cs typeface="Courier New" panose="02070309020205020404" pitchFamily="49" charset="0"/>
+              </a:rPr>
+              <a:t>(start, stop, n)</a:t>
+            </a:r>
+            <a:endParaRPr lang="en-US" sz="1500" b="1" dirty="0" smtClean="0">
+              <a:latin typeface="Courier New" panose="02070309020205020404" pitchFamily="49" charset="0"/>
+              <a:cs typeface="Courier New" panose="02070309020205020404" pitchFamily="49" charset="0"/>
+            </a:endParaRPr>
           </a:p>
           <a:p>
             <a:pPr marL="342900" indent="-342900">
@@ -7071,9 +7166,16 @@
               <a:buChar char="•"/>
             </a:pPr>
             <a:r>
-              <a:rPr lang="en-US" dirty="0" smtClean="0"/>
-              <a:t>zeros</a:t>
-            </a:r>
+              <a:rPr lang="en-US" sz="1500" b="1" dirty="0" smtClean="0">
+                <a:latin typeface="Courier New" panose="02070309020205020404" pitchFamily="49" charset="0"/>
+                <a:cs typeface="Courier New" panose="02070309020205020404" pitchFamily="49" charset="0"/>
+              </a:rPr>
+              <a:t>ones(n) or ones((axes))</a:t>
+            </a:r>
+            <a:endParaRPr lang="en-US" sz="1500" b="1" dirty="0" smtClean="0">
+              <a:latin typeface="Courier New" panose="02070309020205020404" pitchFamily="49" charset="0"/>
+              <a:cs typeface="Courier New" panose="02070309020205020404" pitchFamily="49" charset="0"/>
+            </a:endParaRPr>
           </a:p>
           <a:p>
             <a:pPr marL="342900" indent="-342900">
@@ -7081,10 +7183,38 @@
               <a:buChar char="•"/>
             </a:pPr>
             <a:r>
-              <a:rPr lang="en-US" dirty="0" smtClean="0"/>
-              <a:t>identity</a:t>
-            </a:r>
-            <a:endParaRPr lang="en-US" dirty="0"/>
+              <a:rPr lang="en-US" sz="1500" b="1" dirty="0" smtClean="0">
+                <a:latin typeface="Courier New" panose="02070309020205020404" pitchFamily="49" charset="0"/>
+                <a:cs typeface="Courier New" panose="02070309020205020404" pitchFamily="49" charset="0"/>
+              </a:rPr>
+              <a:t>zeros</a:t>
+            </a:r>
+            <a:r>
+              <a:rPr lang="en-US" sz="1500" b="1" dirty="0" smtClean="0"/>
+              <a:t> </a:t>
+            </a:r>
+            <a:r>
+              <a:rPr lang="en-US" sz="1600" dirty="0" smtClean="0"/>
+              <a:t>(same as ones)</a:t>
+            </a:r>
+            <a:endParaRPr lang="en-US" sz="1600" dirty="0" smtClean="0"/>
+          </a:p>
+          <a:p>
+            <a:pPr marL="342900" indent="-342900">
+              <a:buFont typeface="Arial" panose="020B0604020202020204" pitchFamily="34" charset="0"/>
+              <a:buChar char="•"/>
+            </a:pPr>
+            <a:r>
+              <a:rPr lang="en-US" sz="1500" b="1" dirty="0" smtClean="0">
+                <a:latin typeface="Courier New" panose="02070309020205020404" pitchFamily="49" charset="0"/>
+                <a:cs typeface="Courier New" panose="02070309020205020404" pitchFamily="49" charset="0"/>
+              </a:rPr>
+              <a:t>Identity(size)</a:t>
+            </a:r>
+            <a:endParaRPr lang="en-US" sz="1500" b="1" dirty="0">
+              <a:latin typeface="Courier New" panose="02070309020205020404" pitchFamily="49" charset="0"/>
+              <a:cs typeface="Courier New" panose="02070309020205020404" pitchFamily="49" charset="0"/>
+            </a:endParaRPr>
           </a:p>
         </p:txBody>
       </p:sp>
@@ -7110,6 +7240,9 @@
                     <p:cTn id="3" fill="hold">
                       <p:stCondLst>
                         <p:cond delay="indefinite"/>
+                        <p:cond evt="onBegin" delay="0">
+                          <p:tn val="2"/>
+                        </p:cond>
                       </p:stCondLst>
                       <p:childTnLst>
                         <p:par>
@@ -7119,7 +7252,7 @@
                             </p:stCondLst>
                             <p:childTnLst>
                               <p:par>
-                                <p:cTn id="5" presetID="1" presetClass="entr" presetSubtype="0" fill="hold" nodeType="clickEffect">
+                                <p:cTn id="5" presetID="1" presetClass="entr" presetSubtype="0" fill="hold" nodeType="withEffect">
                                   <p:stCondLst>
                                     <p:cond delay="0"/>
                                   </p:stCondLst>
@@ -7135,6 +7268,37 @@
                                           <p:spTgt spid="4">
                                             <p:txEl>
                                               <p:pRg st="0" end="0"/>
+                                            </p:txEl>
+                                          </p:spTgt>
+                                        </p:tgtEl>
+                                        <p:attrNameLst>
+                                          <p:attrName>style.visibility</p:attrName>
+                                        </p:attrNameLst>
+                                      </p:cBhvr>
+                                      <p:to>
+                                        <p:strVal val="visible"/>
+                                      </p:to>
+                                    </p:set>
+                                  </p:childTnLst>
+                                </p:cTn>
+                              </p:par>
+                              <p:par>
+                                <p:cTn id="7" presetID="1" presetClass="entr" presetSubtype="0" fill="hold" nodeType="withEffect">
+                                  <p:stCondLst>
+                                    <p:cond delay="0"/>
+                                  </p:stCondLst>
+                                  <p:childTnLst>
+                                    <p:set>
+                                      <p:cBhvr>
+                                        <p:cTn id="8" dur="1" fill="hold">
+                                          <p:stCondLst>
+                                            <p:cond delay="0"/>
+                                          </p:stCondLst>
+                                        </p:cTn>
+                                        <p:tgtEl>
+                                          <p:spTgt spid="4">
+                                            <p:txEl>
+                                              <p:pRg st="1" end="1"/>
                                             </p:txEl>
                                           </p:spTgt>
                                         </p:tgtEl>
@@ -7156,26 +7320,26 @@
                     </p:cTn>
                   </p:par>
                   <p:par>
-                    <p:cTn id="7" fill="hold">
+                    <p:cTn id="9" fill="hold">
                       <p:stCondLst>
                         <p:cond delay="indefinite"/>
                       </p:stCondLst>
                       <p:childTnLst>
                         <p:par>
-                          <p:cTn id="8" fill="hold">
+                          <p:cTn id="10" fill="hold">
                             <p:stCondLst>
                               <p:cond delay="0"/>
                             </p:stCondLst>
                             <p:childTnLst>
                               <p:par>
-                                <p:cTn id="9" presetID="1" presetClass="entr" presetSubtype="0" fill="hold" nodeType="clickEffect">
-                                  <p:stCondLst>
-                                    <p:cond delay="0"/>
-                                  </p:stCondLst>
-                                  <p:childTnLst>
-                                    <p:set>
-                                      <p:cBhvr>
-                                        <p:cTn id="10" dur="1" fill="hold">
+                                <p:cTn id="11" presetID="1" presetClass="entr" presetSubtype="0" fill="hold" nodeType="clickEffect">
+                                  <p:stCondLst>
+                                    <p:cond delay="0"/>
+                                  </p:stCondLst>
+                                  <p:childTnLst>
+                                    <p:set>
+                                      <p:cBhvr>
+                                        <p:cTn id="12" dur="1" fill="hold">
                                           <p:stCondLst>
                                             <p:cond delay="0"/>
                                           </p:stCondLst>
@@ -7199,14 +7363,14 @@
                                 </p:cTn>
                               </p:par>
                               <p:par>
-                                <p:cTn id="11" presetID="1" presetClass="entr" presetSubtype="0" fill="hold" nodeType="withEffect">
-                                  <p:stCondLst>
-                                    <p:cond delay="0"/>
-                                  </p:stCondLst>
-                                  <p:childTnLst>
-                                    <p:set>
-                                      <p:cBhvr>
-                                        <p:cTn id="12" dur="1" fill="hold">
+                                <p:cTn id="13" presetID="1" presetClass="entr" presetSubtype="0" fill="hold" nodeType="withEffect">
+                                  <p:stCondLst>
+                                    <p:cond delay="0"/>
+                                  </p:stCondLst>
+                                  <p:childTnLst>
+                                    <p:set>
+                                      <p:cBhvr>
+                                        <p:cTn id="14" dur="1" fill="hold">
                                           <p:stCondLst>
                                             <p:cond delay="0"/>
                                           </p:stCondLst>
@@ -7230,14 +7394,14 @@
                                 </p:cTn>
                               </p:par>
                               <p:par>
-                                <p:cTn id="13" presetID="1" presetClass="entr" presetSubtype="0" fill="hold" nodeType="withEffect">
-                                  <p:stCondLst>
-                                    <p:cond delay="0"/>
-                                  </p:stCondLst>
-                                  <p:childTnLst>
-                                    <p:set>
-                                      <p:cBhvr>
-                                        <p:cTn id="14" dur="1" fill="hold">
+                                <p:cTn id="15" presetID="1" presetClass="entr" presetSubtype="0" fill="hold" nodeType="withEffect">
+                                  <p:stCondLst>
+                                    <p:cond delay="0"/>
+                                  </p:stCondLst>
+                                  <p:childTnLst>
+                                    <p:set>
+                                      <p:cBhvr>
+                                        <p:cTn id="16" dur="1" fill="hold">
                                           <p:stCondLst>
                                             <p:cond delay="0"/>
                                           </p:stCondLst>
@@ -7261,14 +7425,14 @@
                                 </p:cTn>
                               </p:par>
                               <p:par>
-                                <p:cTn id="15" presetID="1" presetClass="entr" presetSubtype="0" fill="hold" nodeType="withEffect">
-                                  <p:stCondLst>
-                                    <p:cond delay="0"/>
-                                  </p:stCondLst>
-                                  <p:childTnLst>
-                                    <p:set>
-                                      <p:cBhvr>
-                                        <p:cTn id="16" dur="1" fill="hold">
+                                <p:cTn id="17" presetID="1" presetClass="entr" presetSubtype="0" fill="hold" nodeType="withEffect">
+                                  <p:stCondLst>
+                                    <p:cond delay="0"/>
+                                  </p:stCondLst>
+                                  <p:childTnLst>
+                                    <p:set>
+                                      <p:cBhvr>
+                                        <p:cTn id="18" dur="1" fill="hold">
                                           <p:stCondLst>
                                             <p:cond delay="0"/>
                                           </p:stCondLst>
@@ -7298,26 +7462,26 @@
                     </p:cTn>
                   </p:par>
                   <p:par>
-                    <p:cTn id="17" fill="hold">
+                    <p:cTn id="19" fill="hold">
                       <p:stCondLst>
                         <p:cond delay="indefinite"/>
                       </p:stCondLst>
                       <p:childTnLst>
                         <p:par>
-                          <p:cTn id="18" fill="hold">
+                          <p:cTn id="20" fill="hold">
                             <p:stCondLst>
                               <p:cond delay="0"/>
                             </p:stCondLst>
                             <p:childTnLst>
                               <p:par>
-                                <p:cTn id="19" presetID="1" presetClass="entr" presetSubtype="0" fill="hold" nodeType="clickEffect">
-                                  <p:stCondLst>
-                                    <p:cond delay="0"/>
-                                  </p:stCondLst>
-                                  <p:childTnLst>
-                                    <p:set>
-                                      <p:cBhvr>
-                                        <p:cTn id="20" dur="1" fill="hold">
+                                <p:cTn id="21" presetID="1" presetClass="entr" presetSubtype="0" fill="hold" nodeType="clickEffect">
+                                  <p:stCondLst>
+                                    <p:cond delay="0"/>
+                                  </p:stCondLst>
+                                  <p:childTnLst>
+                                    <p:set>
+                                      <p:cBhvr>
+                                        <p:cTn id="22" dur="1" fill="hold">
                                           <p:stCondLst>
                                             <p:cond delay="0"/>
                                           </p:stCondLst>
@@ -7325,7 +7489,7 @@
                                         <p:tgtEl>
                                           <p:spTgt spid="4">
                                             <p:txEl>
-                                              <p:pRg st="1" end="1"/>
+                                              <p:pRg st="2" end="2"/>
                                             </p:txEl>
                                           </p:spTgt>
                                         </p:tgtEl>
@@ -7347,26 +7511,26 @@
                     </p:cTn>
                   </p:par>
                   <p:par>
-                    <p:cTn id="21" fill="hold">
+                    <p:cTn id="23" fill="hold">
                       <p:stCondLst>
                         <p:cond delay="indefinite"/>
                       </p:stCondLst>
                       <p:childTnLst>
                         <p:par>
-                          <p:cTn id="22" fill="hold">
+                          <p:cTn id="24" fill="hold">
                             <p:stCondLst>
                               <p:cond delay="0"/>
                             </p:stCondLst>
                             <p:childTnLst>
                               <p:par>
-                                <p:cTn id="23" presetID="1" presetClass="entr" presetSubtype="0" fill="hold" nodeType="clickEffect">
-                                  <p:stCondLst>
-                                    <p:cond delay="0"/>
-                                  </p:stCondLst>
-                                  <p:childTnLst>
-                                    <p:set>
-                                      <p:cBhvr>
-                                        <p:cTn id="24" dur="1" fill="hold">
+                                <p:cTn id="25" presetID="1" presetClass="entr" presetSubtype="0" fill="hold" nodeType="clickEffect">
+                                  <p:stCondLst>
+                                    <p:cond delay="0"/>
+                                  </p:stCondLst>
+                                  <p:childTnLst>
+                                    <p:set>
+                                      <p:cBhvr>
+                                        <p:cTn id="26" dur="1" fill="hold">
                                           <p:stCondLst>
                                             <p:cond delay="0"/>
                                           </p:stCondLst>
@@ -7390,14 +7554,14 @@
                                 </p:cTn>
                               </p:par>
                               <p:par>
-                                <p:cTn id="25" presetID="1" presetClass="entr" presetSubtype="0" fill="hold" nodeType="withEffect">
-                                  <p:stCondLst>
-                                    <p:cond delay="0"/>
-                                  </p:stCondLst>
-                                  <p:childTnLst>
-                                    <p:set>
-                                      <p:cBhvr>
-                                        <p:cTn id="26" dur="1" fill="hold">
+                                <p:cTn id="27" presetID="1" presetClass="entr" presetSubtype="0" fill="hold" nodeType="withEffect">
+                                  <p:stCondLst>
+                                    <p:cond delay="0"/>
+                                  </p:stCondLst>
+                                  <p:childTnLst>
+                                    <p:set>
+                                      <p:cBhvr>
+                                        <p:cTn id="28" dur="1" fill="hold">
                                           <p:stCondLst>
                                             <p:cond delay="0"/>
                                           </p:stCondLst>
@@ -7406,37 +7570,6 @@
                                           <p:spTgt spid="3">
                                             <p:txEl>
                                               <p:pRg st="6" end="6"/>
-                                            </p:txEl>
-                                          </p:spTgt>
-                                        </p:tgtEl>
-                                        <p:attrNameLst>
-                                          <p:attrName>style.visibility</p:attrName>
-                                        </p:attrNameLst>
-                                      </p:cBhvr>
-                                      <p:to>
-                                        <p:strVal val="visible"/>
-                                      </p:to>
-                                    </p:set>
-                                  </p:childTnLst>
-                                </p:cTn>
-                              </p:par>
-                              <p:par>
-                                <p:cTn id="27" presetID="1" presetClass="entr" presetSubtype="0" fill="hold" nodeType="withEffect">
-                                  <p:stCondLst>
-                                    <p:cond delay="0"/>
-                                  </p:stCondLst>
-                                  <p:childTnLst>
-                                    <p:set>
-                                      <p:cBhvr>
-                                        <p:cTn id="28" dur="1" fill="hold">
-                                          <p:stCondLst>
-                                            <p:cond delay="0"/>
-                                          </p:stCondLst>
-                                        </p:cTn>
-                                        <p:tgtEl>
-                                          <p:spTgt spid="3">
-                                            <p:txEl>
-                                              <p:pRg st="7" end="7"/>
                                             </p:txEl>
                                           </p:spTgt>
                                         </p:tgtEl>
@@ -7485,7 +7618,7 @@
                                         <p:tgtEl>
                                           <p:spTgt spid="4">
                                             <p:txEl>
-                                              <p:pRg st="2" end="2"/>
+                                              <p:pRg st="3" end="3"/>
                                             </p:txEl>
                                           </p:spTgt>
                                         </p:tgtEl>
@@ -7534,6 +7667,37 @@
                                         <p:tgtEl>
                                           <p:spTgt spid="3">
                                             <p:txEl>
+                                              <p:pRg st="8" end="8"/>
+                                            </p:txEl>
+                                          </p:spTgt>
+                                        </p:tgtEl>
+                                        <p:attrNameLst>
+                                          <p:attrName>style.visibility</p:attrName>
+                                        </p:attrNameLst>
+                                      </p:cBhvr>
+                                      <p:to>
+                                        <p:strVal val="visible"/>
+                                      </p:to>
+                                    </p:set>
+                                  </p:childTnLst>
+                                </p:cTn>
+                              </p:par>
+                              <p:par>
+                                <p:cTn id="37" presetID="1" presetClass="entr" presetSubtype="0" fill="hold" nodeType="withEffect">
+                                  <p:stCondLst>
+                                    <p:cond delay="0"/>
+                                  </p:stCondLst>
+                                  <p:childTnLst>
+                                    <p:set>
+                                      <p:cBhvr>
+                                        <p:cTn id="38" dur="1" fill="hold">
+                                          <p:stCondLst>
+                                            <p:cond delay="0"/>
+                                          </p:stCondLst>
+                                        </p:cTn>
+                                        <p:tgtEl>
+                                          <p:spTgt spid="3">
+                                            <p:txEl>
                                               <p:pRg st="9" end="9"/>
                                             </p:txEl>
                                           </p:spTgt>
@@ -7550,14 +7714,14 @@
                                 </p:cTn>
                               </p:par>
                               <p:par>
-                                <p:cTn id="37" presetID="1" presetClass="entr" presetSubtype="0" fill="hold" nodeType="withEffect">
-                                  <p:stCondLst>
-                                    <p:cond delay="0"/>
-                                  </p:stCondLst>
-                                  <p:childTnLst>
-                                    <p:set>
-                                      <p:cBhvr>
-                                        <p:cTn id="38" dur="1" fill="hold">
+                                <p:cTn id="39" presetID="1" presetClass="entr" presetSubtype="0" fill="hold" nodeType="withEffect">
+                                  <p:stCondLst>
+                                    <p:cond delay="0"/>
+                                  </p:stCondLst>
+                                  <p:childTnLst>
+                                    <p:set>
+                                      <p:cBhvr>
+                                        <p:cTn id="40" dur="1" fill="hold">
                                           <p:stCondLst>
                                             <p:cond delay="0"/>
                                           </p:stCondLst>
@@ -7587,26 +7751,26 @@
                     </p:cTn>
                   </p:par>
                   <p:par>
-                    <p:cTn id="39" fill="hold">
+                    <p:cTn id="41" fill="hold">
                       <p:stCondLst>
                         <p:cond delay="indefinite"/>
                       </p:stCondLst>
                       <p:childTnLst>
                         <p:par>
-                          <p:cTn id="40" fill="hold">
+                          <p:cTn id="42" fill="hold">
                             <p:stCondLst>
                               <p:cond delay="0"/>
                             </p:stCondLst>
                             <p:childTnLst>
                               <p:par>
-                                <p:cTn id="41" presetID="1" presetClass="entr" presetSubtype="0" fill="hold" nodeType="clickEffect">
-                                  <p:stCondLst>
-                                    <p:cond delay="0"/>
-                                  </p:stCondLst>
-                                  <p:childTnLst>
-                                    <p:set>
-                                      <p:cBhvr>
-                                        <p:cTn id="42" dur="1" fill="hold">
+                                <p:cTn id="43" presetID="1" presetClass="entr" presetSubtype="0" fill="hold" nodeType="clickEffect">
+                                  <p:stCondLst>
+                                    <p:cond delay="0"/>
+                                  </p:stCondLst>
+                                  <p:childTnLst>
+                                    <p:set>
+                                      <p:cBhvr>
+                                        <p:cTn id="44" dur="1" fill="hold">
                                           <p:stCondLst>
                                             <p:cond delay="0"/>
                                           </p:stCondLst>
@@ -7614,7 +7778,7 @@
                                         <p:tgtEl>
                                           <p:spTgt spid="4">
                                             <p:txEl>
-                                              <p:pRg st="3" end="3"/>
+                                              <p:pRg st="4" end="4"/>
                                             </p:txEl>
                                           </p:spTgt>
                                         </p:tgtEl>
@@ -7636,26 +7800,26 @@
                     </p:cTn>
                   </p:par>
                   <p:par>
-                    <p:cTn id="43" fill="hold">
+                    <p:cTn id="45" fill="hold">
                       <p:stCondLst>
                         <p:cond delay="indefinite"/>
                       </p:stCondLst>
                       <p:childTnLst>
                         <p:par>
-                          <p:cTn id="44" fill="hold">
+                          <p:cTn id="46" fill="hold">
                             <p:stCondLst>
                               <p:cond delay="0"/>
                             </p:stCondLst>
                             <p:childTnLst>
                               <p:par>
-                                <p:cTn id="45" presetID="1" presetClass="entr" presetSubtype="0" fill="hold" nodeType="clickEffect">
-                                  <p:stCondLst>
-                                    <p:cond delay="0"/>
-                                  </p:stCondLst>
-                                  <p:childTnLst>
-                                    <p:set>
-                                      <p:cBhvr>
-                                        <p:cTn id="46" dur="1" fill="hold">
+                                <p:cTn id="47" presetID="1" presetClass="entr" presetSubtype="0" fill="hold" nodeType="clickEffect">
+                                  <p:stCondLst>
+                                    <p:cond delay="0"/>
+                                  </p:stCondLst>
+                                  <p:childTnLst>
+                                    <p:set>
+                                      <p:cBhvr>
+                                        <p:cTn id="48" dur="1" fill="hold">
                                           <p:stCondLst>
                                             <p:cond delay="0"/>
                                           </p:stCondLst>
@@ -7679,14 +7843,14 @@
                                 </p:cTn>
                               </p:par>
                               <p:par>
-                                <p:cTn id="47" presetID="1" presetClass="entr" presetSubtype="0" fill="hold" nodeType="withEffect">
-                                  <p:stCondLst>
-                                    <p:cond delay="0"/>
-                                  </p:stCondLst>
-                                  <p:childTnLst>
-                                    <p:set>
-                                      <p:cBhvr>
-                                        <p:cTn id="48" dur="1" fill="hold">
+                                <p:cTn id="49" presetID="1" presetClass="entr" presetSubtype="0" fill="hold" nodeType="withEffect">
+                                  <p:stCondLst>
+                                    <p:cond delay="0"/>
+                                  </p:stCondLst>
+                                  <p:childTnLst>
+                                    <p:set>
+                                      <p:cBhvr>
+                                        <p:cTn id="50" dur="1" fill="hold">
                                           <p:stCondLst>
                                             <p:cond delay="0"/>
                                           </p:stCondLst>
@@ -7709,15 +7873,82 @@
                                   </p:childTnLst>
                                 </p:cTn>
                               </p:par>
-                              <p:par>
-                                <p:cTn id="49" presetID="1" presetClass="entr" presetSubtype="0" fill="hold" nodeType="withEffect">
-                                  <p:stCondLst>
-                                    <p:cond delay="0"/>
-                                  </p:stCondLst>
-                                  <p:childTnLst>
-                                    <p:set>
-                                      <p:cBhvr>
-                                        <p:cTn id="50" dur="1" fill="hold">
+                            </p:childTnLst>
+                          </p:cTn>
+                        </p:par>
+                      </p:childTnLst>
+                    </p:cTn>
+                  </p:par>
+                  <p:par>
+                    <p:cTn id="51" fill="hold">
+                      <p:stCondLst>
+                        <p:cond delay="indefinite"/>
+                      </p:stCondLst>
+                      <p:childTnLst>
+                        <p:par>
+                          <p:cTn id="52" fill="hold">
+                            <p:stCondLst>
+                              <p:cond delay="0"/>
+                            </p:stCondLst>
+                            <p:childTnLst>
+                              <p:par>
+                                <p:cTn id="53" presetID="1" presetClass="entr" presetSubtype="0" fill="hold" nodeType="clickEffect">
+                                  <p:stCondLst>
+                                    <p:cond delay="0"/>
+                                  </p:stCondLst>
+                                  <p:childTnLst>
+                                    <p:set>
+                                      <p:cBhvr>
+                                        <p:cTn id="54" dur="1" fill="hold">
+                                          <p:stCondLst>
+                                            <p:cond delay="0"/>
+                                          </p:stCondLst>
+                                        </p:cTn>
+                                        <p:tgtEl>
+                                          <p:spTgt spid="4">
+                                            <p:txEl>
+                                              <p:pRg st="5" end="5"/>
+                                            </p:txEl>
+                                          </p:spTgt>
+                                        </p:tgtEl>
+                                        <p:attrNameLst>
+                                          <p:attrName>style.visibility</p:attrName>
+                                        </p:attrNameLst>
+                                      </p:cBhvr>
+                                      <p:to>
+                                        <p:strVal val="visible"/>
+                                      </p:to>
+                                    </p:set>
+                                  </p:childTnLst>
+                                </p:cTn>
+                              </p:par>
+                            </p:childTnLst>
+                          </p:cTn>
+                        </p:par>
+                      </p:childTnLst>
+                    </p:cTn>
+                  </p:par>
+                  <p:par>
+                    <p:cTn id="55" fill="hold">
+                      <p:stCondLst>
+                        <p:cond delay="indefinite"/>
+                      </p:stCondLst>
+                      <p:childTnLst>
+                        <p:par>
+                          <p:cTn id="56" fill="hold">
+                            <p:stCondLst>
+                              <p:cond delay="0"/>
+                            </p:stCondLst>
+                            <p:childTnLst>
+                              <p:par>
+                                <p:cTn id="57" presetID="1" presetClass="entr" presetSubtype="0" fill="hold" nodeType="clickEffect">
+                                  <p:stCondLst>
+                                    <p:cond delay="0"/>
+                                  </p:stCondLst>
+                                  <p:childTnLst>
+                                    <p:set>
+                                      <p:cBhvr>
+                                        <p:cTn id="58" dur="1" fill="hold">
                                           <p:stCondLst>
                                             <p:cond delay="0"/>
                                           </p:stCondLst>
@@ -7725,30 +7956,30 @@
                                         <p:tgtEl>
                                           <p:spTgt spid="3">
                                             <p:txEl>
-                                              <p:pRg st="14" end="14"/>
-                                            </p:txEl>
-                                          </p:spTgt>
-                                        </p:tgtEl>
-                                        <p:attrNameLst>
-                                          <p:attrName>style.visibility</p:attrName>
-                                        </p:attrNameLst>
-                                      </p:cBhvr>
-                                      <p:to>
-                                        <p:strVal val="visible"/>
-                                      </p:to>
-                                    </p:set>
-                                  </p:childTnLst>
-                                </p:cTn>
-                              </p:par>
-                              <p:par>
-                                <p:cTn id="51" presetID="1" presetClass="entr" presetSubtype="0" fill="hold" nodeType="withEffect">
-                                  <p:stCondLst>
-                                    <p:cond delay="0"/>
-                                  </p:stCondLst>
-                                  <p:childTnLst>
-                                    <p:set>
-                                      <p:cBhvr>
-                                        <p:cTn id="52" dur="1" fill="hold">
+                                              <p:pRg st="15" end="15"/>
+                                            </p:txEl>
+                                          </p:spTgt>
+                                        </p:tgtEl>
+                                        <p:attrNameLst>
+                                          <p:attrName>style.visibility</p:attrName>
+                                        </p:attrNameLst>
+                                      </p:cBhvr>
+                                      <p:to>
+                                        <p:strVal val="visible"/>
+                                      </p:to>
+                                    </p:set>
+                                  </p:childTnLst>
+                                </p:cTn>
+                              </p:par>
+                              <p:par>
+                                <p:cTn id="59" presetID="1" presetClass="entr" presetSubtype="0" fill="hold" nodeType="withEffect">
+                                  <p:stCondLst>
+                                    <p:cond delay="0"/>
+                                  </p:stCondLst>
+                                  <p:childTnLst>
+                                    <p:set>
+                                      <p:cBhvr>
+                                        <p:cTn id="60" dur="1" fill="hold">
                                           <p:stCondLst>
                                             <p:cond delay="0"/>
                                           </p:stCondLst>
@@ -7756,30 +7987,30 @@
                                         <p:tgtEl>
                                           <p:spTgt spid="3">
                                             <p:txEl>
-                                              <p:pRg st="15" end="15"/>
-                                            </p:txEl>
-                                          </p:spTgt>
-                                        </p:tgtEl>
-                                        <p:attrNameLst>
-                                          <p:attrName>style.visibility</p:attrName>
-                                        </p:attrNameLst>
-                                      </p:cBhvr>
-                                      <p:to>
-                                        <p:strVal val="visible"/>
-                                      </p:to>
-                                    </p:set>
-                                  </p:childTnLst>
-                                </p:cTn>
-                              </p:par>
-                              <p:par>
-                                <p:cTn id="53" presetID="1" presetClass="entr" presetSubtype="0" fill="hold" nodeType="withEffect">
-                                  <p:stCondLst>
-                                    <p:cond delay="0"/>
-                                  </p:stCondLst>
-                                  <p:childTnLst>
-                                    <p:set>
-                                      <p:cBhvr>
-                                        <p:cTn id="54" dur="1" fill="hold">
+                                              <p:pRg st="16" end="16"/>
+                                            </p:txEl>
+                                          </p:spTgt>
+                                        </p:tgtEl>
+                                        <p:attrNameLst>
+                                          <p:attrName>style.visibility</p:attrName>
+                                        </p:attrNameLst>
+                                      </p:cBhvr>
+                                      <p:to>
+                                        <p:strVal val="visible"/>
+                                      </p:to>
+                                    </p:set>
+                                  </p:childTnLst>
+                                </p:cTn>
+                              </p:par>
+                              <p:par>
+                                <p:cTn id="61" presetID="1" presetClass="entr" presetSubtype="0" fill="hold" nodeType="withEffect">
+                                  <p:stCondLst>
+                                    <p:cond delay="0"/>
+                                  </p:stCondLst>
+                                  <p:childTnLst>
+                                    <p:set>
+                                      <p:cBhvr>
+                                        <p:cTn id="62" dur="1" fill="hold">
                                           <p:stCondLst>
                                             <p:cond delay="0"/>
                                           </p:stCondLst>
@@ -7787,7 +8018,69 @@
                                         <p:tgtEl>
                                           <p:spTgt spid="3">
                                             <p:txEl>
-                                              <p:pRg st="16" end="16"/>
+                                              <p:pRg st="17" end="17"/>
+                                            </p:txEl>
+                                          </p:spTgt>
+                                        </p:tgtEl>
+                                        <p:attrNameLst>
+                                          <p:attrName>style.visibility</p:attrName>
+                                        </p:attrNameLst>
+                                      </p:cBhvr>
+                                      <p:to>
+                                        <p:strVal val="visible"/>
+                                      </p:to>
+                                    </p:set>
+                                  </p:childTnLst>
+                                </p:cTn>
+                              </p:par>
+                              <p:par>
+                                <p:cTn id="63" presetID="1" presetClass="entr" presetSubtype="0" fill="hold" nodeType="withEffect">
+                                  <p:stCondLst>
+                                    <p:cond delay="0"/>
+                                  </p:stCondLst>
+                                  <p:childTnLst>
+                                    <p:set>
+                                      <p:cBhvr>
+                                        <p:cTn id="64" dur="1" fill="hold">
+                                          <p:stCondLst>
+                                            <p:cond delay="0"/>
+                                          </p:stCondLst>
+                                        </p:cTn>
+                                        <p:tgtEl>
+                                          <p:spTgt spid="3">
+                                            <p:txEl>
+                                              <p:pRg st="18" end="18"/>
+                                            </p:txEl>
+                                          </p:spTgt>
+                                        </p:tgtEl>
+                                        <p:attrNameLst>
+                                          <p:attrName>style.visibility</p:attrName>
+                                        </p:attrNameLst>
+                                      </p:cBhvr>
+                                      <p:to>
+                                        <p:strVal val="visible"/>
+                                      </p:to>
+                                    </p:set>
+                                  </p:childTnLst>
+                                </p:cTn>
+                              </p:par>
+                              <p:par>
+                                <p:cTn id="65" presetID="1" presetClass="entr" presetSubtype="0" fill="hold" nodeType="withEffect">
+                                  <p:stCondLst>
+                                    <p:cond delay="0"/>
+                                  </p:stCondLst>
+                                  <p:childTnLst>
+                                    <p:set>
+                                      <p:cBhvr>
+                                        <p:cTn id="66" dur="1" fill="hold">
+                                          <p:stCondLst>
+                                            <p:cond delay="0"/>
+                                          </p:stCondLst>
+                                        </p:cTn>
+                                        <p:tgtEl>
+                                          <p:spTgt spid="3">
+                                            <p:txEl>
+                                              <p:pRg st="19" end="19"/>
                                             </p:txEl>
                                           </p:spTgt>
                                         </p:tgtEl>
@@ -8053,15 +8346,7 @@
           <a:p>
             <a:r>
               <a:rPr lang="en-US" dirty="0" smtClean="0"/>
-              <a:t>Operations are </a:t>
-            </a:r>
-            <a:r>
-              <a:rPr lang="en-US" dirty="0" smtClean="0"/>
-              <a:t>element-by-element </a:t>
-            </a:r>
-            <a:r>
-              <a:rPr lang="en-US" dirty="0" smtClean="0"/>
-              <a:t>(must match in size)</a:t>
+              <a:t>Operations are element-by-element (must match in size)</a:t>
             </a:r>
             <a:endParaRPr lang="en-US" dirty="0"/>
           </a:p>

</xml_diff>